<commit_message>
creacion de varios PDF con los datos tomados del archivo json completado
</commit_message>
<xml_diff>
--- a/img/PANTILLA CERTIFICADOS.pptx
+++ b/img/PANTILLA CERTIFICADOS.pptx
@@ -112,15 +112,6 @@
 </p:presentation>
 </file>
 
-<file path=ppt/revisionInfo.xml><?xml version="1.0" encoding="utf-8"?>
-<p1510:revInfo xmlns:a="http://schemas.openxmlformats.org/drawingml/2006/main" xmlns:r="http://schemas.openxmlformats.org/officeDocument/2006/relationships" xmlns:p1510="http://schemas.microsoft.com/office/powerpoint/2015/10/main">
-  <p1510:revLst>
-    <p1510:client id="{04601754-0EDE-4C0D-96FC-A5EA166BDDE7}" v="1" dt="2022-03-11T20:01:17.122"/>
-    <p1510:client id="{D0A0CFC5-1D10-41E1-81A8-60B1F07A3251}" v="78" dt="2022-01-28T14:41:51.638"/>
-  </p1510:revLst>
-</p1510:revInfo>
-</file>
-
 <file path=ppt/changesInfos/changesInfo1.xml><?xml version="1.0" encoding="utf-8"?>
 <pc:chgInfo xmlns:a="http://schemas.openxmlformats.org/drawingml/2006/main" xmlns:r="http://schemas.openxmlformats.org/officeDocument/2006/relationships" xmlns:ac="http://schemas.microsoft.com/office/drawing/2013/main/command" xmlns:pc="http://schemas.microsoft.com/office/powerpoint/2013/main/command">
   <pc:docChgLst>
@@ -337,7 +328,7 @@
           <a:p>
             <a:fld id="{B24DD38C-14DC-46C0-8D46-3CCC248BCCE0}" type="datetimeFigureOut">
               <a:rPr lang="es-CO" smtClean="0"/>
-              <a:t>16/03/2022</a:t>
+              <a:t>30/03/2022</a:t>
             </a:fld>
             <a:endParaRPr lang="es-CO"/>
           </a:p>
@@ -507,7 +498,7 @@
           <a:p>
             <a:fld id="{B24DD38C-14DC-46C0-8D46-3CCC248BCCE0}" type="datetimeFigureOut">
               <a:rPr lang="es-CO" smtClean="0"/>
-              <a:t>16/03/2022</a:t>
+              <a:t>30/03/2022</a:t>
             </a:fld>
             <a:endParaRPr lang="es-CO"/>
           </a:p>
@@ -687,7 +678,7 @@
           <a:p>
             <a:fld id="{B24DD38C-14DC-46C0-8D46-3CCC248BCCE0}" type="datetimeFigureOut">
               <a:rPr lang="es-CO" smtClean="0"/>
-              <a:t>16/03/2022</a:t>
+              <a:t>30/03/2022</a:t>
             </a:fld>
             <a:endParaRPr lang="es-CO"/>
           </a:p>
@@ -857,7 +848,7 @@
           <a:p>
             <a:fld id="{B24DD38C-14DC-46C0-8D46-3CCC248BCCE0}" type="datetimeFigureOut">
               <a:rPr lang="es-CO" smtClean="0"/>
-              <a:t>16/03/2022</a:t>
+              <a:t>30/03/2022</a:t>
             </a:fld>
             <a:endParaRPr lang="es-CO"/>
           </a:p>
@@ -1101,7 +1092,7 @@
           <a:p>
             <a:fld id="{B24DD38C-14DC-46C0-8D46-3CCC248BCCE0}" type="datetimeFigureOut">
               <a:rPr lang="es-CO" smtClean="0"/>
-              <a:t>16/03/2022</a:t>
+              <a:t>30/03/2022</a:t>
             </a:fld>
             <a:endParaRPr lang="es-CO"/>
           </a:p>
@@ -1333,7 +1324,7 @@
           <a:p>
             <a:fld id="{B24DD38C-14DC-46C0-8D46-3CCC248BCCE0}" type="datetimeFigureOut">
               <a:rPr lang="es-CO" smtClean="0"/>
-              <a:t>16/03/2022</a:t>
+              <a:t>30/03/2022</a:t>
             </a:fld>
             <a:endParaRPr lang="es-CO"/>
           </a:p>
@@ -1700,7 +1691,7 @@
           <a:p>
             <a:fld id="{B24DD38C-14DC-46C0-8D46-3CCC248BCCE0}" type="datetimeFigureOut">
               <a:rPr lang="es-CO" smtClean="0"/>
-              <a:t>16/03/2022</a:t>
+              <a:t>30/03/2022</a:t>
             </a:fld>
             <a:endParaRPr lang="es-CO"/>
           </a:p>
@@ -1818,7 +1809,7 @@
           <a:p>
             <a:fld id="{B24DD38C-14DC-46C0-8D46-3CCC248BCCE0}" type="datetimeFigureOut">
               <a:rPr lang="es-CO" smtClean="0"/>
-              <a:t>16/03/2022</a:t>
+              <a:t>30/03/2022</a:t>
             </a:fld>
             <a:endParaRPr lang="es-CO"/>
           </a:p>
@@ -1913,7 +1904,7 @@
           <a:p>
             <a:fld id="{B24DD38C-14DC-46C0-8D46-3CCC248BCCE0}" type="datetimeFigureOut">
               <a:rPr lang="es-CO" smtClean="0"/>
-              <a:t>16/03/2022</a:t>
+              <a:t>30/03/2022</a:t>
             </a:fld>
             <a:endParaRPr lang="es-CO"/>
           </a:p>
@@ -2190,7 +2181,7 @@
           <a:p>
             <a:fld id="{B24DD38C-14DC-46C0-8D46-3CCC248BCCE0}" type="datetimeFigureOut">
               <a:rPr lang="es-CO" smtClean="0"/>
-              <a:t>16/03/2022</a:t>
+              <a:t>30/03/2022</a:t>
             </a:fld>
             <a:endParaRPr lang="es-CO"/>
           </a:p>
@@ -2447,7 +2438,7 @@
           <a:p>
             <a:fld id="{B24DD38C-14DC-46C0-8D46-3CCC248BCCE0}" type="datetimeFigureOut">
               <a:rPr lang="es-CO" smtClean="0"/>
-              <a:t>16/03/2022</a:t>
+              <a:t>30/03/2022</a:t>
             </a:fld>
             <a:endParaRPr lang="es-CO"/>
           </a:p>
@@ -2660,7 +2651,7 @@
           <a:p>
             <a:fld id="{B24DD38C-14DC-46C0-8D46-3CCC248BCCE0}" type="datetimeFigureOut">
               <a:rPr lang="es-CO" smtClean="0"/>
-              <a:t>16/03/2022</a:t>
+              <a:t>30/03/2022</a:t>
             </a:fld>
             <a:endParaRPr lang="es-CO"/>
           </a:p>
@@ -3108,13 +3099,18 @@
           <a:lstStyle/>
           <a:p>
             <a:r>
-              <a:rPr lang="es-CO" sz="2240" b="1" dirty="0">
+              <a:rPr lang="es-CO" sz="2240" b="1">
                 <a:latin typeface="Open Sans bold italic" panose="020B0806030504020204" pitchFamily="34" charset="0"/>
                 <a:ea typeface="Open Sans bold italic" panose="020B0806030504020204" pitchFamily="34" charset="0"/>
                 <a:cs typeface="Open Sans bold italic" panose="020B0806030504020204" pitchFamily="34" charset="0"/>
               </a:rPr>
               <a:t>Luis Felipe Mesa Salazar.</a:t>
             </a:r>
+            <a:endParaRPr lang="es-CO" sz="2240" b="1" dirty="0">
+              <a:latin typeface="Open Sans bold italic" panose="020B0806030504020204" pitchFamily="34" charset="0"/>
+              <a:ea typeface="Open Sans bold italic" panose="020B0806030504020204" pitchFamily="34" charset="0"/>
+              <a:cs typeface="Open Sans bold italic" panose="020B0806030504020204" pitchFamily="34" charset="0"/>
+            </a:endParaRPr>
           </a:p>
         </p:txBody>
       </p:sp>
@@ -3722,21 +3718,6 @@
 </file>
 
 <file path=customXml/item1.xml><?xml version="1.0" encoding="utf-8"?>
-<?mso-contentType ?>
-<FormTemplates xmlns="http://schemas.microsoft.com/sharepoint/v3/contenttype/forms">
-  <Display>DocumentLibraryForm</Display>
-  <Edit>DocumentLibraryForm</Edit>
-  <New>DocumentLibraryForm</New>
-</FormTemplates>
-</file>
-
-<file path=customXml/item2.xml><?xml version="1.0" encoding="utf-8"?>
-<p:properties xmlns:p="http://schemas.microsoft.com/office/2006/metadata/properties" xmlns:xsi="http://www.w3.org/2001/XMLSchema-instance" xmlns:pc="http://schemas.microsoft.com/office/infopath/2007/PartnerControls">
-  <documentManagement/>
-</p:properties>
-</file>
-
-<file path=customXml/item3.xml><?xml version="1.0" encoding="utf-8"?>
 <ct:contentTypeSchema xmlns:ct="http://schemas.microsoft.com/office/2006/metadata/contentType" xmlns:ma="http://schemas.microsoft.com/office/2006/metadata/properties/metaAttributes" ct:_="" ma:_="" ma:contentTypeName="Documento" ma:contentTypeID="0x010100B073443C20B7E947AD5858D43131D3DD" ma:contentTypeVersion="19" ma:contentTypeDescription="Crear nuevo documento." ma:contentTypeScope="" ma:versionID="55a0fcd45e96e13785a79bf7f89df414">
   <xsd:schema xmlns:xsd="http://www.w3.org/2001/XMLSchema" xmlns:xs="http://www.w3.org/2001/XMLSchema" xmlns:p="http://schemas.microsoft.com/office/2006/metadata/properties" xmlns:ns2="a6038ef7-2eb7-49a1-97ba-492a0f1f227f" xmlns:ns3="e24c94de-a519-481b-884a-5f0d857e47e8" targetNamespace="http://schemas.microsoft.com/office/2006/metadata/properties" ma:root="true" ma:fieldsID="79857f5b8ae8cfe54ebf3eba9e3109fe" ns2:_="" ns3:_="">
     <xsd:import namespace="a6038ef7-2eb7-49a1-97ba-492a0f1f227f"/>
@@ -3945,24 +3926,22 @@
 </ct:contentTypeSchema>
 </file>
 
-<file path=customXml/itemProps1.xml><?xml version="1.0" encoding="utf-8"?>
-<ds:datastoreItem xmlns:ds="http://schemas.openxmlformats.org/officeDocument/2006/customXml" ds:itemID="{639C419A-FF3D-48C6-96BE-F3DFA12F280D}">
-  <ds:schemaRefs>
-    <ds:schemaRef ds:uri="http://schemas.microsoft.com/sharepoint/v3/contenttype/forms"/>
-  </ds:schemaRefs>
-</ds:datastoreItem>
+<file path=customXml/item2.xml><?xml version="1.0" encoding="utf-8"?>
+<p:properties xmlns:p="http://schemas.microsoft.com/office/2006/metadata/properties" xmlns:xsi="http://www.w3.org/2001/XMLSchema-instance" xmlns:pc="http://schemas.microsoft.com/office/infopath/2007/PartnerControls">
+  <documentManagement/>
+</p:properties>
 </file>
 
-<file path=customXml/itemProps2.xml><?xml version="1.0" encoding="utf-8"?>
-<ds:datastoreItem xmlns:ds="http://schemas.openxmlformats.org/officeDocument/2006/customXml" ds:itemID="{1ADF9299-1E15-4DBA-B853-31F00069A9A6}">
-  <ds:schemaRefs>
-    <ds:schemaRef ds:uri="http://schemas.microsoft.com/office/2006/metadata/properties"/>
-    <ds:schemaRef ds:uri="http://schemas.microsoft.com/office/infopath/2007/PartnerControls"/>
-  </ds:schemaRefs>
-</ds:datastoreItem>
+<file path=customXml/item3.xml><?xml version="1.0" encoding="utf-8"?>
+<?mso-contentType ?>
+<FormTemplates xmlns="http://schemas.microsoft.com/sharepoint/v3/contenttype/forms">
+  <Display>DocumentLibraryForm</Display>
+  <Edit>DocumentLibraryForm</Edit>
+  <New>DocumentLibraryForm</New>
+</FormTemplates>
 </file>
 
-<file path=customXml/itemProps3.xml><?xml version="1.0" encoding="utf-8"?>
+<file path=customXml/itemProps1.xml><?xml version="1.0" encoding="utf-8"?>
 <ds:datastoreItem xmlns:ds="http://schemas.openxmlformats.org/officeDocument/2006/customXml" ds:itemID="{98AC8C84-C85D-46BC-B2AF-E5F40CFF5654}">
   <ds:schemaRefs>
     <ds:schemaRef ds:uri="http://schemas.microsoft.com/office/2006/metadata/contentType"/>
@@ -3979,4 +3958,21 @@
     <ds:schemaRef ds:uri="http://schemas.microsoft.com/internal/obd"/>
   </ds:schemaRefs>
 </ds:datastoreItem>
+</file>
+
+<file path=customXml/itemProps2.xml><?xml version="1.0" encoding="utf-8"?>
+<ds:datastoreItem xmlns:ds="http://schemas.openxmlformats.org/officeDocument/2006/customXml" ds:itemID="{1ADF9299-1E15-4DBA-B853-31F00069A9A6}">
+  <ds:schemaRefs>
+    <ds:schemaRef ds:uri="http://schemas.microsoft.com/office/2006/metadata/properties"/>
+    <ds:schemaRef ds:uri="http://schemas.microsoft.com/office/infopath/2007/PartnerControls"/>
+  </ds:schemaRefs>
+</ds:datastoreItem>
+</file>
+
+<file path=customXml/itemProps3.xml><?xml version="1.0" encoding="utf-8"?>
+<ds:datastoreItem xmlns:ds="http://schemas.openxmlformats.org/officeDocument/2006/customXml" ds:itemID="{639C419A-FF3D-48C6-96BE-F3DFA12F280D}">
+  <ds:schemaRefs>
+    <ds:schemaRef ds:uri="http://schemas.microsoft.com/sharepoint/v3/contenttype/forms"/>
+  </ds:schemaRefs>
+</ds:datastoreItem>
 </file>
</xml_diff>